<commit_message>
update app + prediction + rapport interactif + Trainer v3
</commit_message>
<xml_diff>
--- a/Présentation rattrapage PA.pptx
+++ b/Présentation rattrapage PA.pptx
@@ -138,6 +138,8 @@
     <p1510:client id="{32A2FD5A-37E6-2924-4DD9-8B26E6F4809D}" v="333" dt="2021-07-27T12:30:37.823"/>
     <p1510:client id="{3FE01F80-4AAA-F007-FE75-E3784CB60BE1}" v="1" dt="2021-09-07T00:59:02.455"/>
     <p1510:client id="{8336E6B7-F7E5-70FD-3427-AC5951063867}" v="19" dt="2021-07-26T18:40:34.188"/>
+    <p1510:client id="{83390983-3B28-A65F-EA8D-AAF0004EBA12}" v="3" dt="2021-09-07T10:24:41.112"/>
+    <p1510:client id="{85F5912F-CEB9-C74A-E256-296F14B5C1C7}" v="4" dt="2021-09-07T08:43:00.206"/>
     <p1510:client id="{8CB952CA-9FA6-921A-5FAB-95F7A5C57170}" v="131" dt="2021-09-07T00:54:31.104"/>
     <p1510:client id="{9979B327-6A27-22F7-5845-5C8DEA72C172}" v="894" dt="2021-09-06T19:22:15.903"/>
     <p1510:client id="{9F214FC6-9F8E-A70C-38A9-8D95F3E113F0}" v="646" dt="2021-09-05T10:21:29.398"/>
@@ -231,7 +233,7 @@
           <a:p>
             <a:fld id="{60DA1757-DF83-4484-9F54-C7B035228300}" type="datetimeFigureOut">
               <a:rPr lang="en-US" smtClean="0"/>
-              <a:t>9/6/2021</a:t>
+              <a:t>9/7/2021</a:t>
             </a:fld>
             <a:endParaRPr lang="en-US"/>
           </a:p>
@@ -648,7 +650,7 @@
           <a:p>
             <a:fld id="{F8CAF083-96CE-4F4E-9985-DB4FD6CD4407}" type="datetime1">
               <a:rPr lang="en-US" smtClean="0"/>
-              <a:t>9/6/2021</a:t>
+              <a:t>9/7/2021</a:t>
             </a:fld>
             <a:endParaRPr lang="en-US"/>
           </a:p>
@@ -863,7 +865,7 @@
           <a:p>
             <a:fld id="{5A0D43E4-C176-4CD4-BFED-2EF6197B74C6}" type="datetime1">
               <a:rPr lang="en-US" smtClean="0"/>
-              <a:t>9/6/2021</a:t>
+              <a:t>9/7/2021</a:t>
             </a:fld>
             <a:endParaRPr lang="en-US"/>
           </a:p>
@@ -1088,7 +1090,7 @@
           <a:p>
             <a:fld id="{0A6CD3BF-595B-49A4-8F8F-A149C20B96E6}" type="datetime1">
               <a:rPr lang="en-US" smtClean="0"/>
-              <a:t>9/6/2021</a:t>
+              <a:t>9/7/2021</a:t>
             </a:fld>
             <a:endParaRPr lang="en-US"/>
           </a:p>
@@ -1303,7 +1305,7 @@
           <a:p>
             <a:fld id="{0940D937-824F-42D7-B5C3-9F7910AB63C2}" type="datetime1">
               <a:rPr lang="en-US" smtClean="0"/>
-              <a:t>9/6/2021</a:t>
+              <a:t>9/7/2021</a:t>
             </a:fld>
             <a:endParaRPr lang="en-US"/>
           </a:p>
@@ -1594,7 +1596,7 @@
           <a:p>
             <a:fld id="{DE653A0E-E504-40B8-9248-AD70C9628B1F}" type="datetime1">
               <a:rPr lang="en-US" smtClean="0"/>
-              <a:t>9/6/2021</a:t>
+              <a:t>9/7/2021</a:t>
             </a:fld>
             <a:endParaRPr lang="en-US"/>
           </a:p>
@@ -1877,7 +1879,7 @@
           <a:p>
             <a:fld id="{12D5D704-7A36-4D64-90D8-840F00DFC00E}" type="datetime1">
               <a:rPr lang="en-US" smtClean="0"/>
-              <a:t>9/6/2021</a:t>
+              <a:t>9/7/2021</a:t>
             </a:fld>
             <a:endParaRPr lang="en-US"/>
           </a:p>
@@ -2307,7 +2309,7 @@
           <a:p>
             <a:fld id="{7484C941-209C-4080-A895-04B3BFC6FDC0}" type="datetime1">
               <a:rPr lang="en-US" smtClean="0"/>
-              <a:t>9/6/2021</a:t>
+              <a:t>9/7/2021</a:t>
             </a:fld>
             <a:endParaRPr lang="en-US"/>
           </a:p>
@@ -2464,7 +2466,7 @@
           <a:p>
             <a:fld id="{ABBE320F-34AF-4141-80AB-1F9D858250BC}" type="datetime1">
               <a:rPr lang="en-US" smtClean="0"/>
-              <a:t>9/6/2021</a:t>
+              <a:t>9/7/2021</a:t>
             </a:fld>
             <a:endParaRPr lang="en-US"/>
           </a:p>
@@ -2592,7 +2594,7 @@
           <a:p>
             <a:fld id="{BE482D41-8FA0-4777-9B44-1E9E073C7A0B}" type="datetime1">
               <a:rPr lang="en-US" smtClean="0"/>
-              <a:t>9/6/2021</a:t>
+              <a:t>9/7/2021</a:t>
             </a:fld>
             <a:endParaRPr lang="en-US"/>
           </a:p>
@@ -2920,7 +2922,7 @@
           <a:p>
             <a:fld id="{16C68D7A-E645-4DE0-8A50-F5EDAFFDBF45}" type="datetime1">
               <a:rPr lang="en-US" smtClean="0"/>
-              <a:t>9/6/2021</a:t>
+              <a:t>9/7/2021</a:t>
             </a:fld>
             <a:endParaRPr lang="en-US"/>
           </a:p>
@@ -3224,7 +3226,7 @@
           <a:p>
             <a:fld id="{85944ED5-3130-461F-8D92-018BB7D37932}" type="datetime1">
               <a:rPr lang="en-US" smtClean="0"/>
-              <a:t>9/6/2021</a:t>
+              <a:t>9/7/2021</a:t>
             </a:fld>
             <a:endParaRPr lang="en-US"/>
           </a:p>
@@ -3482,7 +3484,7 @@
           <a:p>
             <a:fld id="{36A674EA-1DF5-4ECD-A72B-90A36DCB5DAF}" type="datetime1">
               <a:rPr lang="en-US" smtClean="0"/>
-              <a:t>9/6/2021</a:t>
+              <a:t>9/7/2021</a:t>
             </a:fld>
             <a:endParaRPr lang="en-US"/>
           </a:p>
@@ -7728,13 +7730,19 @@
           <a:p>
             <a:pPr algn="ctr"/>
             <a:r>
-              <a:rPr lang="fr-FR" sz="5200" b="1">
+              <a:rPr lang="fr-FR" sz="5200" b="1" dirty="0">
+                <a:solidFill>
+                  <a:schemeClr val="bg1"/>
+                </a:solidFill>
                 <a:ea typeface="+mj-lt"/>
                 <a:cs typeface="+mj-lt"/>
               </a:rPr>
               <a:t>Conclusion</a:t>
             </a:r>
-            <a:endParaRPr lang="fr-FR" sz="5200">
+            <a:endParaRPr lang="fr-FR" sz="5200" dirty="0">
+              <a:solidFill>
+                <a:schemeClr val="bg1"/>
+              </a:solidFill>
               <a:ea typeface="+mj-lt"/>
               <a:cs typeface="+mj-lt"/>
             </a:endParaRPr>
@@ -12264,7 +12272,7 @@
               <a:buAutoNum type="romanUcPeriod"/>
             </a:pPr>
             <a:r>
-              <a:rPr lang="fr-FR" sz="2000">
+              <a:rPr lang="fr-FR" sz="2000" dirty="0">
                 <a:solidFill>
                   <a:schemeClr val="tx1">
                     <a:alpha val="80000"/>
@@ -12281,7 +12289,7 @@
               <a:buAutoNum type="romanUcPeriod"/>
             </a:pPr>
             <a:r>
-              <a:rPr lang="fr-FR" sz="2000">
+              <a:rPr lang="fr-FR" sz="2000" dirty="0">
                 <a:solidFill>
                   <a:schemeClr val="tx1">
                     <a:alpha val="80000"/>
@@ -12292,7 +12300,7 @@
               <a:t>Objectifs</a:t>
             </a:r>
             <a:r>
-              <a:rPr lang="fr-FR" sz="2000">
+              <a:rPr lang="fr-FR" sz="2000" dirty="0">
                 <a:solidFill>
                   <a:schemeClr val="tx1">
                     <a:alpha val="80000"/>
@@ -12303,7 +12311,7 @@
               </a:rPr>
               <a:t> de l'application</a:t>
             </a:r>
-            <a:endParaRPr lang="fr-FR" sz="2000">
+            <a:endParaRPr lang="fr-FR" sz="2000" dirty="0">
               <a:solidFill>
                 <a:schemeClr val="tx1">
                   <a:alpha val="80000"/>
@@ -12318,7 +12326,7 @@
               <a:buAutoNum type="romanUcPeriod"/>
             </a:pPr>
             <a:r>
-              <a:rPr lang="fr-FR" sz="2000" err="1">
+              <a:rPr lang="fr-FR" sz="2000" dirty="0" err="1">
                 <a:solidFill>
                   <a:schemeClr val="tx1">
                     <a:alpha val="80000"/>
@@ -12330,7 +12338,7 @@
               <a:t>Technology</a:t>
             </a:r>
             <a:r>
-              <a:rPr lang="fr-FR" sz="2000">
+              <a:rPr lang="fr-FR" sz="2000" dirty="0">
                 <a:solidFill>
                   <a:schemeClr val="tx1">
                     <a:alpha val="80000"/>
@@ -12347,7 +12355,7 @@
               <a:buAutoNum type="romanUcPeriod"/>
             </a:pPr>
             <a:r>
-              <a:rPr lang="fr-FR" sz="2000">
+              <a:rPr lang="fr-FR" sz="2000" dirty="0">
                 <a:solidFill>
                   <a:schemeClr val="tx1">
                     <a:alpha val="80000"/>
@@ -12360,7 +12368,7 @@
               <a:t>Constitution du </a:t>
             </a:r>
             <a:r>
-              <a:rPr lang="fr-FR" sz="2000" err="1">
+              <a:rPr lang="fr-FR" sz="2000" dirty="0" err="1">
                 <a:solidFill>
                   <a:schemeClr val="tx1">
                     <a:alpha val="80000"/>
@@ -12372,13 +12380,23 @@
               </a:rPr>
               <a:t>dataset</a:t>
             </a:r>
+            <a:endParaRPr lang="fr-FR" sz="2000" dirty="0">
+              <a:solidFill>
+                <a:schemeClr val="tx1">
+                  <a:alpha val="80000"/>
+                </a:schemeClr>
+              </a:solidFill>
+              <a:latin typeface="Calibri Light" panose="020F0302020204030204"/>
+              <a:ea typeface="+mn-lt"/>
+              <a:cs typeface="+mn-lt"/>
+            </a:endParaRPr>
           </a:p>
           <a:p>
             <a:pPr marL="457200" indent="-457200">
               <a:buAutoNum type="romanUcPeriod"/>
             </a:pPr>
             <a:r>
-              <a:rPr lang="fr-FR" sz="2000">
+              <a:rPr lang="fr-FR" sz="2000" dirty="0">
                 <a:solidFill>
                   <a:schemeClr val="tx1">
                     <a:alpha val="80000"/>
@@ -12391,7 +12409,7 @@
               <a:t>Étude</a:t>
             </a:r>
             <a:r>
-              <a:rPr lang="fr-FR" sz="2000">
+              <a:rPr lang="fr-FR" sz="2000" dirty="0">
                 <a:solidFill>
                   <a:schemeClr val="tx1">
                     <a:alpha val="80000"/>
@@ -12402,7 +12420,7 @@
               </a:rPr>
               <a:t> des modèles</a:t>
             </a:r>
-            <a:endParaRPr lang="fr-FR" sz="2000">
+            <a:endParaRPr lang="fr-FR" sz="2000" dirty="0">
               <a:solidFill>
                 <a:schemeClr val="tx1">
                   <a:alpha val="80000"/>
@@ -12417,43 +12435,7 @@
               <a:buAutoNum type="romanUcPeriod"/>
             </a:pPr>
             <a:r>
-              <a:rPr lang="fr-FR" sz="2000">
-                <a:solidFill>
-                  <a:schemeClr val="tx1">
-                    <a:alpha val="80000"/>
-                  </a:schemeClr>
-                </a:solidFill>
-                <a:latin typeface="+mj-lt"/>
-              </a:rPr>
-              <a:t>Comparaison avec </a:t>
-            </a:r>
-            <a:r>
-              <a:rPr lang="fr-FR" sz="2000" err="1">
-                <a:solidFill>
-                  <a:schemeClr val="tx1">
-                    <a:alpha val="80000"/>
-                  </a:schemeClr>
-                </a:solidFill>
-                <a:latin typeface="+mj-lt"/>
-              </a:rPr>
-              <a:t>Keras</a:t>
-            </a:r>
-            <a:endParaRPr lang="fr-FR" sz="2000" err="1">
-              <a:solidFill>
-                <a:schemeClr val="tx1">
-                  <a:alpha val="80000"/>
-                </a:schemeClr>
-              </a:solidFill>
-              <a:latin typeface="+mj-lt"/>
-              <a:cs typeface="Calibri" panose="020F0502020204030204"/>
-            </a:endParaRPr>
-          </a:p>
-          <a:p>
-            <a:pPr marL="457200" indent="-457200">
-              <a:buAutoNum type="romanUcPeriod"/>
-            </a:pPr>
-            <a:r>
-              <a:rPr lang="fr-FR" sz="2000">
+              <a:rPr lang="fr-FR" sz="2000" dirty="0">
                 <a:solidFill>
                   <a:schemeClr val="tx1">
                     <a:alpha val="80000"/>
@@ -12464,7 +12446,7 @@
               </a:rPr>
               <a:t>Démonstration</a:t>
             </a:r>
-            <a:endParaRPr lang="fr-FR" sz="2000">
+            <a:endParaRPr lang="fr-FR" sz="2000" dirty="0">
               <a:solidFill>
                 <a:schemeClr val="tx1">
                   <a:alpha val="80000"/>
@@ -12478,7 +12460,7 @@
               <a:buAutoNum type="romanUcPeriod"/>
             </a:pPr>
             <a:r>
-              <a:rPr lang="fr-FR" sz="2000">
+              <a:rPr lang="fr-FR" sz="2000" dirty="0">
                 <a:solidFill>
                   <a:schemeClr val="tx1">
                     <a:alpha val="80000"/>
@@ -12488,7 +12470,7 @@
               </a:rPr>
               <a:t>Conclusion</a:t>
             </a:r>
-            <a:endParaRPr lang="fr-FR" sz="2000">
+            <a:endParaRPr lang="fr-FR" sz="2000" dirty="0">
               <a:solidFill>
                 <a:schemeClr val="tx1">
                   <a:alpha val="80000"/>
@@ -12503,7 +12485,7 @@
               <a:buAutoNum type="romanUcPeriod"/>
             </a:pPr>
             <a:r>
-              <a:rPr lang="fr-FR" sz="2000">
+              <a:rPr lang="fr-FR" sz="2000" dirty="0">
                 <a:solidFill>
                   <a:schemeClr val="tx1">
                     <a:alpha val="80000"/>
@@ -12513,7 +12495,7 @@
               </a:rPr>
               <a:t>Ouverture</a:t>
             </a:r>
-            <a:endParaRPr lang="fr-FR" sz="2000">
+            <a:endParaRPr lang="fr-FR" sz="2000" dirty="0">
               <a:solidFill>
                 <a:schemeClr val="tx1">
                   <a:alpha val="80000"/>

</xml_diff>